<commit_message>
Full documentation changed and corrected
</commit_message>
<xml_diff>
--- a/Documentation/Presentation.pptx
+++ b/Documentation/Presentation.pptx
@@ -5,21 +5,22 @@
     <p:sldMasterId id="2147483648" r:id="rId1"/>
   </p:sldMasterIdLst>
   <p:notesMasterIdLst>
-    <p:notesMasterId r:id="rId14"/>
+    <p:notesMasterId r:id="rId15"/>
   </p:notesMasterIdLst>
   <p:sldIdLst>
     <p:sldId id="256" r:id="rId2"/>
     <p:sldId id="257" r:id="rId3"/>
     <p:sldId id="258" r:id="rId4"/>
     <p:sldId id="262" r:id="rId5"/>
-    <p:sldId id="261" r:id="rId6"/>
-    <p:sldId id="263" r:id="rId7"/>
-    <p:sldId id="264" r:id="rId8"/>
-    <p:sldId id="268" r:id="rId9"/>
-    <p:sldId id="265" r:id="rId10"/>
-    <p:sldId id="266" r:id="rId11"/>
-    <p:sldId id="267" r:id="rId12"/>
-    <p:sldId id="269" r:id="rId13"/>
+    <p:sldId id="270" r:id="rId6"/>
+    <p:sldId id="261" r:id="rId7"/>
+    <p:sldId id="263" r:id="rId8"/>
+    <p:sldId id="264" r:id="rId9"/>
+    <p:sldId id="268" r:id="rId10"/>
+    <p:sldId id="265" r:id="rId11"/>
+    <p:sldId id="266" r:id="rId12"/>
+    <p:sldId id="267" r:id="rId13"/>
+    <p:sldId id="269" r:id="rId14"/>
   </p:sldIdLst>
   <p:sldSz cx="9907588" cy="6858000"/>
   <p:notesSz cx="6796088" cy="9925050"/>
@@ -3326,10 +3327,10 @@
       </p:grpSpPr>
       <p:pic>
         <p:nvPicPr>
-          <p:cNvPr id="4" name="Picture 3">
+          <p:cNvPr id="6" name="Picture 5">
             <a:extLst>
               <a:ext uri="{FF2B5EF4-FFF2-40B4-BE49-F238E27FC236}">
-                <a16:creationId xmlns:a16="http://schemas.microsoft.com/office/drawing/2014/main" id="{31CBBD44-672B-42A5-BC37-7B4BCEF00346}"/>
+                <a16:creationId xmlns:a16="http://schemas.microsoft.com/office/drawing/2014/main" id="{F5F70966-FB80-4A0E-87AE-AF8B19803C27}"/>
               </a:ext>
             </a:extLst>
           </p:cNvPr>
@@ -3346,8 +3347,8 @@
         </p:blipFill>
         <p:spPr>
           <a:xfrm>
-            <a:off x="0" y="1107719"/>
-            <a:ext cx="9907588" cy="4642561"/>
+            <a:off x="138688" y="0"/>
+            <a:ext cx="9630212" cy="6858000"/>
           </a:xfrm>
           <a:prstGeom prst="rect">
             <a:avLst/>
@@ -3357,7 +3358,7 @@
     </p:spTree>
     <p:extLst>
       <p:ext uri="{BB962C8B-B14F-4D97-AF65-F5344CB8AC3E}">
-        <p14:creationId xmlns:p14="http://schemas.microsoft.com/office/powerpoint/2010/main" val="693054801"/>
+        <p14:creationId xmlns:p14="http://schemas.microsoft.com/office/powerpoint/2010/main" val="2094866265"/>
       </p:ext>
     </p:extLst>
   </p:cSld>
@@ -3389,7 +3390,7 @@
           <p:cNvPr id="3" name="Picture 2">
             <a:extLst>
               <a:ext uri="{FF2B5EF4-FFF2-40B4-BE49-F238E27FC236}">
-                <a16:creationId xmlns:a16="http://schemas.microsoft.com/office/drawing/2014/main" id="{5E4DD310-E9C5-4432-BC19-6F1DF572B4D0}"/>
+                <a16:creationId xmlns:a16="http://schemas.microsoft.com/office/drawing/2014/main" id="{EDC0FAFD-A602-4523-885B-0076E3B11501}"/>
               </a:ext>
             </a:extLst>
           </p:cNvPr>
@@ -3406,8 +3407,8 @@
         </p:blipFill>
         <p:spPr>
           <a:xfrm>
-            <a:off x="257969" y="147637"/>
-            <a:ext cx="9391650" cy="6562725"/>
+            <a:off x="0" y="1113321"/>
+            <a:ext cx="9907588" cy="4631358"/>
           </a:xfrm>
           <a:prstGeom prst="rect">
             <a:avLst/>
@@ -3417,7 +3418,7 @@
     </p:spTree>
     <p:extLst>
       <p:ext uri="{BB962C8B-B14F-4D97-AF65-F5344CB8AC3E}">
-        <p14:creationId xmlns:p14="http://schemas.microsoft.com/office/powerpoint/2010/main" val="1299200941"/>
+        <p14:creationId xmlns:p14="http://schemas.microsoft.com/office/powerpoint/2010/main" val="693054801"/>
       </p:ext>
     </p:extLst>
   </p:cSld>
@@ -3449,7 +3450,7 @@
           <p:cNvPr id="4" name="Picture 3">
             <a:extLst>
               <a:ext uri="{FF2B5EF4-FFF2-40B4-BE49-F238E27FC236}">
-                <a16:creationId xmlns:a16="http://schemas.microsoft.com/office/drawing/2014/main" id="{9FF9BC75-816A-4CBC-AC2F-619F1C9696B8}"/>
+                <a16:creationId xmlns:a16="http://schemas.microsoft.com/office/drawing/2014/main" id="{AB82A294-30E3-4BC1-B308-B591AAF38AA2}"/>
               </a:ext>
             </a:extLst>
           </p:cNvPr>
@@ -3466,8 +3467,68 @@
         </p:blipFill>
         <p:spPr>
           <a:xfrm>
-            <a:off x="219869" y="2462212"/>
-            <a:ext cx="9467850" cy="1933575"/>
+            <a:off x="0" y="148313"/>
+            <a:ext cx="9907588" cy="6561374"/>
+          </a:xfrm>
+          <a:prstGeom prst="rect">
+            <a:avLst/>
+          </a:prstGeom>
+        </p:spPr>
+      </p:pic>
+    </p:spTree>
+    <p:extLst>
+      <p:ext uri="{BB962C8B-B14F-4D97-AF65-F5344CB8AC3E}">
+        <p14:creationId xmlns:p14="http://schemas.microsoft.com/office/powerpoint/2010/main" val="1299200941"/>
+      </p:ext>
+    </p:extLst>
+  </p:cSld>
+  <p:clrMapOvr>
+    <a:masterClrMapping/>
+  </p:clrMapOvr>
+</p:sld>
+</file>
+
+<file path=ppt/slides/slide13.xml><?xml version="1.0" encoding="utf-8"?>
+<p:sld xmlns:a="http://schemas.openxmlformats.org/drawingml/2006/main" xmlns:r="http://schemas.openxmlformats.org/officeDocument/2006/relationships" xmlns:p="http://schemas.openxmlformats.org/presentationml/2006/main">
+  <p:cSld>
+    <p:spTree>
+      <p:nvGrpSpPr>
+        <p:cNvPr id="1" name=""/>
+        <p:cNvGrpSpPr/>
+        <p:nvPr/>
+      </p:nvGrpSpPr>
+      <p:grpSpPr>
+        <a:xfrm>
+          <a:off x="0" y="0"/>
+          <a:ext cx="0" cy="0"/>
+          <a:chOff x="0" y="0"/>
+          <a:chExt cx="0" cy="0"/>
+        </a:xfrm>
+      </p:grpSpPr>
+      <p:pic>
+        <p:nvPicPr>
+          <p:cNvPr id="3" name="Picture 2">
+            <a:extLst>
+              <a:ext uri="{FF2B5EF4-FFF2-40B4-BE49-F238E27FC236}">
+                <a16:creationId xmlns:a16="http://schemas.microsoft.com/office/drawing/2014/main" id="{E981C0B2-05E7-49E1-89DD-5B22CE58E487}"/>
+              </a:ext>
+            </a:extLst>
+          </p:cNvPr>
+          <p:cNvPicPr>
+            <a:picLocks noChangeAspect="1"/>
+          </p:cNvPicPr>
+          <p:nvPr/>
+        </p:nvPicPr>
+        <p:blipFill>
+          <a:blip r:embed="rId2"/>
+          <a:stretch>
+            <a:fillRect/>
+          </a:stretch>
+        </p:blipFill>
+        <p:spPr>
+          <a:xfrm>
+            <a:off x="0" y="2550481"/>
+            <a:ext cx="9907588" cy="1757037"/>
           </a:xfrm>
           <a:prstGeom prst="rect">
             <a:avLst/>
@@ -3506,10 +3567,10 @@
       </p:grpSpPr>
       <p:pic>
         <p:nvPicPr>
-          <p:cNvPr id="4" name="Picture 3">
+          <p:cNvPr id="3" name="Picture 2">
             <a:extLst>
               <a:ext uri="{FF2B5EF4-FFF2-40B4-BE49-F238E27FC236}">
-                <a16:creationId xmlns:a16="http://schemas.microsoft.com/office/drawing/2014/main" id="{9F91B308-4EB8-42D7-92BD-C59D537420CD}"/>
+                <a16:creationId xmlns:a16="http://schemas.microsoft.com/office/drawing/2014/main" id="{90115EB3-CF80-4302-828D-BD491057812A}"/>
               </a:ext>
             </a:extLst>
           </p:cNvPr>
@@ -3526,8 +3587,8 @@
         </p:blipFill>
         <p:spPr>
           <a:xfrm>
-            <a:off x="159400" y="0"/>
-            <a:ext cx="9588787" cy="6858000"/>
+            <a:off x="161737" y="0"/>
+            <a:ext cx="9584113" cy="6858000"/>
           </a:xfrm>
           <a:prstGeom prst="rect">
             <a:avLst/>
@@ -3626,10 +3687,10 @@
       </p:grpSpPr>
       <p:pic>
         <p:nvPicPr>
-          <p:cNvPr id="3" name="Picture 2">
+          <p:cNvPr id="4" name="Picture 3">
             <a:extLst>
               <a:ext uri="{FF2B5EF4-FFF2-40B4-BE49-F238E27FC236}">
-                <a16:creationId xmlns:a16="http://schemas.microsoft.com/office/drawing/2014/main" id="{C45FC43D-37FE-4879-9D29-E7006ACECF7C}"/>
+                <a16:creationId xmlns:a16="http://schemas.microsoft.com/office/drawing/2014/main" id="{7BD37B25-577D-40E7-BB5F-9B3C9DA462C3}"/>
               </a:ext>
             </a:extLst>
           </p:cNvPr>
@@ -3646,8 +3707,8 @@
         </p:blipFill>
         <p:spPr>
           <a:xfrm>
-            <a:off x="300971" y="219075"/>
-            <a:ext cx="4238625" cy="6443034"/>
+            <a:off x="0" y="0"/>
+            <a:ext cx="4912043" cy="6858000"/>
           </a:xfrm>
           <a:prstGeom prst="rect">
             <a:avLst/>
@@ -3656,10 +3717,10 @@
       </p:pic>
       <p:pic>
         <p:nvPicPr>
-          <p:cNvPr id="6" name="Picture 5">
+          <p:cNvPr id="7" name="Picture 6">
             <a:extLst>
               <a:ext uri="{FF2B5EF4-FFF2-40B4-BE49-F238E27FC236}">
-                <a16:creationId xmlns:a16="http://schemas.microsoft.com/office/drawing/2014/main" id="{6F488FFC-59E2-4033-AC8C-FAB222A9AF44}"/>
+                <a16:creationId xmlns:a16="http://schemas.microsoft.com/office/drawing/2014/main" id="{9A43EE67-96DA-40C5-B5D8-EBF7A9F74C45}"/>
               </a:ext>
             </a:extLst>
           </p:cNvPr>
@@ -3676,8 +3737,8 @@
         </p:blipFill>
         <p:spPr>
           <a:xfrm>
-            <a:off x="5181756" y="219075"/>
-            <a:ext cx="4238625" cy="6419850"/>
+            <a:off x="4872489" y="0"/>
+            <a:ext cx="5035099" cy="6858000"/>
           </a:xfrm>
           <a:prstGeom prst="rect">
             <a:avLst/>
@@ -3719,7 +3780,7 @@
           <p:cNvPr id="3" name="Picture 2">
             <a:extLst>
               <a:ext uri="{FF2B5EF4-FFF2-40B4-BE49-F238E27FC236}">
-                <a16:creationId xmlns:a16="http://schemas.microsoft.com/office/drawing/2014/main" id="{8ABEF7C7-7A49-498C-AA0A-815ACD8F89A4}"/>
+                <a16:creationId xmlns:a16="http://schemas.microsoft.com/office/drawing/2014/main" id="{413484E8-9ABC-4214-8F3B-6E3CF4247FFE}"/>
               </a:ext>
             </a:extLst>
           </p:cNvPr>
@@ -3736,8 +3797,8 @@
         </p:blipFill>
         <p:spPr>
           <a:xfrm>
-            <a:off x="185981" y="0"/>
-            <a:ext cx="9535625" cy="6858000"/>
+            <a:off x="2463947" y="0"/>
+            <a:ext cx="4979694" cy="6858000"/>
           </a:xfrm>
           <a:prstGeom prst="rect">
             <a:avLst/>
@@ -3747,7 +3808,7 @@
     </p:spTree>
     <p:extLst>
       <p:ext uri="{BB962C8B-B14F-4D97-AF65-F5344CB8AC3E}">
-        <p14:creationId xmlns:p14="http://schemas.microsoft.com/office/powerpoint/2010/main" val="3689031562"/>
+        <p14:creationId xmlns:p14="http://schemas.microsoft.com/office/powerpoint/2010/main" val="2532072165"/>
       </p:ext>
     </p:extLst>
   </p:cSld>
@@ -3776,10 +3837,10 @@
       </p:grpSpPr>
       <p:pic>
         <p:nvPicPr>
-          <p:cNvPr id="3" name="Picture 2">
+          <p:cNvPr id="4" name="Picture 3">
             <a:extLst>
               <a:ext uri="{FF2B5EF4-FFF2-40B4-BE49-F238E27FC236}">
-                <a16:creationId xmlns:a16="http://schemas.microsoft.com/office/drawing/2014/main" id="{04B0BB1A-9BB4-487D-8792-04CAEEBF567C}"/>
+                <a16:creationId xmlns:a16="http://schemas.microsoft.com/office/drawing/2014/main" id="{F7834FA3-E1E0-480D-8A7B-3D761E45821D}"/>
               </a:ext>
             </a:extLst>
           </p:cNvPr>
@@ -3796,8 +3857,128 @@
         </p:blipFill>
         <p:spPr>
           <a:xfrm>
-            <a:off x="122021" y="0"/>
-            <a:ext cx="9663545" cy="6858000"/>
+            <a:off x="156962" y="0"/>
+            <a:ext cx="9593664" cy="6858000"/>
+          </a:xfrm>
+          <a:prstGeom prst="rect">
+            <a:avLst/>
+          </a:prstGeom>
+        </p:spPr>
+      </p:pic>
+      <p:pic>
+        <p:nvPicPr>
+          <p:cNvPr id="6" name="Picture 5">
+            <a:extLst>
+              <a:ext uri="{FF2B5EF4-FFF2-40B4-BE49-F238E27FC236}">
+                <a16:creationId xmlns:a16="http://schemas.microsoft.com/office/drawing/2014/main" id="{5C00F0D0-E5B4-4FCD-B447-AC3EF627F483}"/>
+              </a:ext>
+            </a:extLst>
+          </p:cNvPr>
+          <p:cNvPicPr>
+            <a:picLocks noChangeAspect="1"/>
+          </p:cNvPicPr>
+          <p:nvPr/>
+        </p:nvPicPr>
+        <p:blipFill>
+          <a:blip r:embed="rId3"/>
+          <a:stretch>
+            <a:fillRect/>
+          </a:stretch>
+        </p:blipFill>
+        <p:spPr>
+          <a:xfrm>
+            <a:off x="640374" y="1960775"/>
+            <a:ext cx="3882234" cy="3386085"/>
+          </a:xfrm>
+          <a:prstGeom prst="rect">
+            <a:avLst/>
+          </a:prstGeom>
+        </p:spPr>
+      </p:pic>
+      <p:pic>
+        <p:nvPicPr>
+          <p:cNvPr id="8" name="Picture 7">
+            <a:extLst>
+              <a:ext uri="{FF2B5EF4-FFF2-40B4-BE49-F238E27FC236}">
+                <a16:creationId xmlns:a16="http://schemas.microsoft.com/office/drawing/2014/main" id="{6D6A31EA-F1CB-476A-B6A6-7A686D1A33A6}"/>
+              </a:ext>
+            </a:extLst>
+          </p:cNvPr>
+          <p:cNvPicPr>
+            <a:picLocks noChangeAspect="1"/>
+          </p:cNvPicPr>
+          <p:nvPr/>
+        </p:nvPicPr>
+        <p:blipFill>
+          <a:blip r:embed="rId4"/>
+          <a:stretch>
+            <a:fillRect/>
+          </a:stretch>
+        </p:blipFill>
+        <p:spPr>
+          <a:xfrm>
+            <a:off x="4697572" y="1772579"/>
+            <a:ext cx="179228" cy="140993"/>
+          </a:xfrm>
+          <a:prstGeom prst="rect">
+            <a:avLst/>
+          </a:prstGeom>
+        </p:spPr>
+      </p:pic>
+      <p:pic>
+        <p:nvPicPr>
+          <p:cNvPr id="10" name="Picture 9">
+            <a:extLst>
+              <a:ext uri="{FF2B5EF4-FFF2-40B4-BE49-F238E27FC236}">
+                <a16:creationId xmlns:a16="http://schemas.microsoft.com/office/drawing/2014/main" id="{C0A3CEDA-145A-4460-8C46-56EDB27436AD}"/>
+              </a:ext>
+            </a:extLst>
+          </p:cNvPr>
+          <p:cNvPicPr>
+            <a:picLocks noChangeAspect="1"/>
+          </p:cNvPicPr>
+          <p:nvPr/>
+        </p:nvPicPr>
+        <p:blipFill>
+          <a:blip r:embed="rId5"/>
+          <a:stretch>
+            <a:fillRect/>
+          </a:stretch>
+        </p:blipFill>
+        <p:spPr>
+          <a:xfrm>
+            <a:off x="4713764" y="1597744"/>
+            <a:ext cx="146843" cy="144355"/>
+          </a:xfrm>
+          <a:prstGeom prst="rect">
+            <a:avLst/>
+          </a:prstGeom>
+        </p:spPr>
+      </p:pic>
+      <p:pic>
+        <p:nvPicPr>
+          <p:cNvPr id="12" name="Picture 11">
+            <a:extLst>
+              <a:ext uri="{FF2B5EF4-FFF2-40B4-BE49-F238E27FC236}">
+                <a16:creationId xmlns:a16="http://schemas.microsoft.com/office/drawing/2014/main" id="{D8DD2ABF-1E26-401A-851A-07DDC69051E6}"/>
+              </a:ext>
+            </a:extLst>
+          </p:cNvPr>
+          <p:cNvPicPr>
+            <a:picLocks noChangeAspect="1"/>
+          </p:cNvPicPr>
+          <p:nvPr/>
+        </p:nvPicPr>
+        <p:blipFill>
+          <a:blip r:embed="rId6"/>
+          <a:stretch>
+            <a:fillRect/>
+          </a:stretch>
+        </p:blipFill>
+        <p:spPr>
+          <a:xfrm>
+            <a:off x="4713763" y="1403425"/>
+            <a:ext cx="147121" cy="144355"/>
           </a:xfrm>
           <a:prstGeom prst="rect">
             <a:avLst/>
@@ -3807,7 +3988,7 @@
     </p:spTree>
     <p:extLst>
       <p:ext uri="{BB962C8B-B14F-4D97-AF65-F5344CB8AC3E}">
-        <p14:creationId xmlns:p14="http://schemas.microsoft.com/office/powerpoint/2010/main" val="3715049631"/>
+        <p14:creationId xmlns:p14="http://schemas.microsoft.com/office/powerpoint/2010/main" val="3689031562"/>
       </p:ext>
     </p:extLst>
   </p:cSld>
@@ -3836,10 +4017,10 @@
       </p:grpSpPr>
       <p:pic>
         <p:nvPicPr>
-          <p:cNvPr id="3" name="Picture 2">
+          <p:cNvPr id="4" name="Picture 3">
             <a:extLst>
               <a:ext uri="{FF2B5EF4-FFF2-40B4-BE49-F238E27FC236}">
-                <a16:creationId xmlns:a16="http://schemas.microsoft.com/office/drawing/2014/main" id="{CFEF1794-ED9A-47D8-B17B-EE40B6D64759}"/>
+                <a16:creationId xmlns:a16="http://schemas.microsoft.com/office/drawing/2014/main" id="{64A636E3-C077-4E51-9F74-14626E793E80}"/>
               </a:ext>
             </a:extLst>
           </p:cNvPr>
@@ -3856,38 +4037,8 @@
         </p:blipFill>
         <p:spPr>
           <a:xfrm>
-            <a:off x="362744" y="101225"/>
-            <a:ext cx="4591050" cy="6438900"/>
-          </a:xfrm>
-          <a:prstGeom prst="rect">
-            <a:avLst/>
-          </a:prstGeom>
-        </p:spPr>
-      </p:pic>
-      <p:pic>
-        <p:nvPicPr>
-          <p:cNvPr id="8" name="Picture 7">
-            <a:extLst>
-              <a:ext uri="{FF2B5EF4-FFF2-40B4-BE49-F238E27FC236}">
-                <a16:creationId xmlns:a16="http://schemas.microsoft.com/office/drawing/2014/main" id="{A5EA3B51-B317-485C-8252-97DE7CBEF6B5}"/>
-              </a:ext>
-            </a:extLst>
-          </p:cNvPr>
-          <p:cNvPicPr>
-            <a:picLocks noChangeAspect="1"/>
-          </p:cNvPicPr>
-          <p:nvPr/>
-        </p:nvPicPr>
-        <p:blipFill>
-          <a:blip r:embed="rId3"/>
-          <a:stretch>
-            <a:fillRect/>
-          </a:stretch>
-        </p:blipFill>
-        <p:spPr>
-          <a:xfrm>
-            <a:off x="4953794" y="101225"/>
-            <a:ext cx="4572000" cy="6438900"/>
+            <a:off x="128989" y="0"/>
+            <a:ext cx="9649609" cy="6858000"/>
           </a:xfrm>
           <a:prstGeom prst="rect">
             <a:avLst/>
@@ -3897,7 +4048,7 @@
     </p:spTree>
     <p:extLst>
       <p:ext uri="{BB962C8B-B14F-4D97-AF65-F5344CB8AC3E}">
-        <p14:creationId xmlns:p14="http://schemas.microsoft.com/office/powerpoint/2010/main" val="3601942829"/>
+        <p14:creationId xmlns:p14="http://schemas.microsoft.com/office/powerpoint/2010/main" val="3715049631"/>
       </p:ext>
     </p:extLst>
   </p:cSld>
@@ -3926,10 +4077,10 @@
       </p:grpSpPr>
       <p:pic>
         <p:nvPicPr>
-          <p:cNvPr id="3" name="Picture 2">
+          <p:cNvPr id="4" name="Picture 3">
             <a:extLst>
               <a:ext uri="{FF2B5EF4-FFF2-40B4-BE49-F238E27FC236}">
-                <a16:creationId xmlns:a16="http://schemas.microsoft.com/office/drawing/2014/main" id="{2F8F1C5B-39B4-4F64-9988-EFC98D3B10F2}"/>
+                <a16:creationId xmlns:a16="http://schemas.microsoft.com/office/drawing/2014/main" id="{DE6093E2-A7F3-4EC3-BE26-7BAAD01AC51A}"/>
               </a:ext>
             </a:extLst>
           </p:cNvPr>
@@ -3946,8 +4097,38 @@
         </p:blipFill>
         <p:spPr>
           <a:xfrm>
-            <a:off x="2375258" y="0"/>
-            <a:ext cx="5157071" cy="6858000"/>
+            <a:off x="0" y="0"/>
+            <a:ext cx="4893691" cy="6858000"/>
+          </a:xfrm>
+          <a:prstGeom prst="rect">
+            <a:avLst/>
+          </a:prstGeom>
+        </p:spPr>
+      </p:pic>
+      <p:pic>
+        <p:nvPicPr>
+          <p:cNvPr id="6" name="Picture 5">
+            <a:extLst>
+              <a:ext uri="{FF2B5EF4-FFF2-40B4-BE49-F238E27FC236}">
+                <a16:creationId xmlns:a16="http://schemas.microsoft.com/office/drawing/2014/main" id="{310FA48E-9502-4BF8-8462-8A4B8A7BDA80}"/>
+              </a:ext>
+            </a:extLst>
+          </p:cNvPr>
+          <p:cNvPicPr>
+            <a:picLocks noChangeAspect="1"/>
+          </p:cNvPicPr>
+          <p:nvPr/>
+        </p:nvPicPr>
+        <p:blipFill>
+          <a:blip r:embed="rId3"/>
+          <a:stretch>
+            <a:fillRect/>
+          </a:stretch>
+        </p:blipFill>
+        <p:spPr>
+          <a:xfrm>
+            <a:off x="4905499" y="0"/>
+            <a:ext cx="4963141" cy="6858000"/>
           </a:xfrm>
           <a:prstGeom prst="rect">
             <a:avLst/>
@@ -3957,7 +4138,7 @@
     </p:spTree>
     <p:extLst>
       <p:ext uri="{BB962C8B-B14F-4D97-AF65-F5344CB8AC3E}">
-        <p14:creationId xmlns:p14="http://schemas.microsoft.com/office/powerpoint/2010/main" val="711332786"/>
+        <p14:creationId xmlns:p14="http://schemas.microsoft.com/office/powerpoint/2010/main" val="3601942829"/>
       </p:ext>
     </p:extLst>
   </p:cSld>
@@ -3986,10 +4167,10 @@
       </p:grpSpPr>
       <p:pic>
         <p:nvPicPr>
-          <p:cNvPr id="3" name="Picture 2">
+          <p:cNvPr id="4" name="Picture 3">
             <a:extLst>
               <a:ext uri="{FF2B5EF4-FFF2-40B4-BE49-F238E27FC236}">
-                <a16:creationId xmlns:a16="http://schemas.microsoft.com/office/drawing/2014/main" id="{1F7397D6-3525-4B5C-B7BC-BFB7FD251E84}"/>
+                <a16:creationId xmlns:a16="http://schemas.microsoft.com/office/drawing/2014/main" id="{0DF9E717-F001-4D89-B83E-90FF5BE2065D}"/>
               </a:ext>
             </a:extLst>
           </p:cNvPr>
@@ -4006,8 +4187,38 @@
         </p:blipFill>
         <p:spPr>
           <a:xfrm>
-            <a:off x="396081" y="176212"/>
-            <a:ext cx="9115425" cy="6505575"/>
+            <a:off x="71530" y="0"/>
+            <a:ext cx="4956858" cy="6858000"/>
+          </a:xfrm>
+          <a:prstGeom prst="rect">
+            <a:avLst/>
+          </a:prstGeom>
+        </p:spPr>
+      </p:pic>
+      <p:pic>
+        <p:nvPicPr>
+          <p:cNvPr id="6" name="Picture 5">
+            <a:extLst>
+              <a:ext uri="{FF2B5EF4-FFF2-40B4-BE49-F238E27FC236}">
+                <a16:creationId xmlns:a16="http://schemas.microsoft.com/office/drawing/2014/main" id="{AAD638C7-5627-4D71-978B-57F14344A2E9}"/>
+              </a:ext>
+            </a:extLst>
+          </p:cNvPr>
+          <p:cNvPicPr>
+            <a:picLocks noChangeAspect="1"/>
+          </p:cNvPicPr>
+          <p:nvPr/>
+        </p:nvPicPr>
+        <p:blipFill>
+          <a:blip r:embed="rId3"/>
+          <a:stretch>
+            <a:fillRect/>
+          </a:stretch>
+        </p:blipFill>
+        <p:spPr>
+          <a:xfrm>
+            <a:off x="4956996" y="0"/>
+            <a:ext cx="4950592" cy="6858000"/>
           </a:xfrm>
           <a:prstGeom prst="rect">
             <a:avLst/>
@@ -4017,7 +4228,7 @@
     </p:spTree>
     <p:extLst>
       <p:ext uri="{BB962C8B-B14F-4D97-AF65-F5344CB8AC3E}">
-        <p14:creationId xmlns:p14="http://schemas.microsoft.com/office/powerpoint/2010/main" val="2094866265"/>
+        <p14:creationId xmlns:p14="http://schemas.microsoft.com/office/powerpoint/2010/main" val="711332786"/>
       </p:ext>
     </p:extLst>
   </p:cSld>

</xml_diff>